<commit_message>
livraison des documents contractuels
</commit_message>
<xml_diff>
--- a/Grillades Oncle SAMMY site vitrine.pptx
+++ b/Grillades Oncle SAMMY site vitrine.pptx
@@ -9,10 +9,12 @@
     <p:sldId id="270" r:id="rId3"/>
     <p:sldId id="269" r:id="rId4"/>
     <p:sldId id="272" r:id="rId5"/>
-    <p:sldId id="273" r:id="rId6"/>
-    <p:sldId id="274" r:id="rId7"/>
-    <p:sldId id="275" r:id="rId8"/>
-    <p:sldId id="276" r:id="rId9"/>
+    <p:sldId id="277" r:id="rId6"/>
+    <p:sldId id="278" r:id="rId7"/>
+    <p:sldId id="279" r:id="rId8"/>
+    <p:sldId id="273" r:id="rId9"/>
+    <p:sldId id="274" r:id="rId10"/>
+    <p:sldId id="275" r:id="rId11"/>
   </p:sldIdLst>
   <p:sldSz cx="12192000" cy="6858000"/>
   <p:notesSz cx="6858000" cy="9144000"/>
@@ -451,7 +453,7 @@
             <a:fld id="{B61BEF0D-F0BB-DE4B-95CE-6DB70DBA9567}" type="datetimeFigureOut">
               <a:rPr lang="en-US" dirty="0"/>
               <a:pPr/>
-              <a:t>10/4/2021</a:t>
+              <a:t>10/5/2021</a:t>
             </a:fld>
             <a:endParaRPr lang="en-US" dirty="0"/>
           </a:p>
@@ -772,7 +774,7 @@
             <a:fld id="{B61BEF0D-F0BB-DE4B-95CE-6DB70DBA9567}" type="datetimeFigureOut">
               <a:rPr lang="en-US" dirty="0"/>
               <a:pPr/>
-              <a:t>10/4/2021</a:t>
+              <a:t>10/5/2021</a:t>
             </a:fld>
             <a:endParaRPr lang="en-US" dirty="0"/>
           </a:p>
@@ -1017,7 +1019,7 @@
             <a:fld id="{B61BEF0D-F0BB-DE4B-95CE-6DB70DBA9567}" type="datetimeFigureOut">
               <a:rPr lang="en-US" dirty="0"/>
               <a:pPr/>
-              <a:t>10/4/2021</a:t>
+              <a:t>10/5/2021</a:t>
             </a:fld>
             <a:endParaRPr lang="en-US" dirty="0"/>
           </a:p>
@@ -1353,7 +1355,7 @@
             <a:fld id="{B61BEF0D-F0BB-DE4B-95CE-6DB70DBA9567}" type="datetimeFigureOut">
               <a:rPr lang="en-US" dirty="0"/>
               <a:pPr/>
-              <a:t>10/4/2021</a:t>
+              <a:t>10/5/2021</a:t>
             </a:fld>
             <a:endParaRPr lang="en-US" dirty="0"/>
           </a:p>
@@ -1697,7 +1699,7 @@
             <a:fld id="{B61BEF0D-F0BB-DE4B-95CE-6DB70DBA9567}" type="datetimeFigureOut">
               <a:rPr lang="en-US" dirty="0"/>
               <a:pPr/>
-              <a:t>10/4/2021</a:t>
+              <a:t>10/5/2021</a:t>
             </a:fld>
             <a:endParaRPr lang="en-US" dirty="0"/>
           </a:p>
@@ -2068,7 +2070,7 @@
             <a:fld id="{B61BEF0D-F0BB-DE4B-95CE-6DB70DBA9567}" type="datetimeFigureOut">
               <a:rPr lang="en-US" dirty="0"/>
               <a:pPr/>
-              <a:t>10/4/2021</a:t>
+              <a:t>10/5/2021</a:t>
             </a:fld>
             <a:endParaRPr lang="en-US" dirty="0"/>
           </a:p>
@@ -2535,7 +2537,7 @@
             <a:fld id="{B61BEF0D-F0BB-DE4B-95CE-6DB70DBA9567}" type="datetimeFigureOut">
               <a:rPr lang="en-US" dirty="0"/>
               <a:pPr/>
-              <a:t>10/4/2021</a:t>
+              <a:t>10/5/2021</a:t>
             </a:fld>
             <a:endParaRPr lang="en-US" dirty="0"/>
           </a:p>
@@ -2737,7 +2739,7 @@
             <a:fld id="{B61BEF0D-F0BB-DE4B-95CE-6DB70DBA9567}" type="datetimeFigureOut">
               <a:rPr lang="en-US" dirty="0"/>
               <a:pPr/>
-              <a:t>10/4/2021</a:t>
+              <a:t>10/5/2021</a:t>
             </a:fld>
             <a:endParaRPr lang="en-US" dirty="0"/>
           </a:p>
@@ -2945,7 +2947,7 @@
             <a:fld id="{B61BEF0D-F0BB-DE4B-95CE-6DB70DBA9567}" type="datetimeFigureOut">
               <a:rPr lang="en-US" dirty="0"/>
               <a:pPr/>
-              <a:t>10/4/2021</a:t>
+              <a:t>10/5/2021</a:t>
             </a:fld>
             <a:endParaRPr lang="en-US" dirty="0"/>
           </a:p>
@@ -3173,7 +3175,7 @@
           <a:p>
             <a:fld id="{05BFA754-D5C3-4E66-96A6-867B257F58DC}" type="datetimeFigureOut">
               <a:rPr lang="en-US" dirty="0"/>
-              <a:t>10/4/2021</a:t>
+              <a:t>10/5/2021</a:t>
             </a:fld>
             <a:endParaRPr lang="en-US" dirty="0"/>
           </a:p>
@@ -3417,7 +3419,7 @@
             <a:fld id="{B61BEF0D-F0BB-DE4B-95CE-6DB70DBA9567}" type="datetimeFigureOut">
               <a:rPr lang="en-US" dirty="0"/>
               <a:pPr/>
-              <a:t>10/4/2021</a:t>
+              <a:t>10/5/2021</a:t>
             </a:fld>
             <a:endParaRPr lang="en-US" dirty="0"/>
           </a:p>
@@ -3680,7 +3682,7 @@
           <a:p>
             <a:fld id="{05BFA754-D5C3-4E66-96A6-867B257F58DC}" type="datetimeFigureOut">
               <a:rPr lang="en-US" dirty="0"/>
-              <a:t>10/4/2021</a:t>
+              <a:t>10/5/2021</a:t>
             </a:fld>
             <a:endParaRPr lang="en-US" dirty="0"/>
           </a:p>
@@ -4089,7 +4091,7 @@
             <a:fld id="{B61BEF0D-F0BB-DE4B-95CE-6DB70DBA9567}" type="datetimeFigureOut">
               <a:rPr lang="en-US" dirty="0"/>
               <a:pPr/>
-              <a:t>10/4/2021</a:t>
+              <a:t>10/5/2021</a:t>
             </a:fld>
             <a:endParaRPr lang="en-US" dirty="0"/>
           </a:p>
@@ -4235,7 +4237,7 @@
             <a:fld id="{B61BEF0D-F0BB-DE4B-95CE-6DB70DBA9567}" type="datetimeFigureOut">
               <a:rPr lang="en-US" dirty="0"/>
               <a:pPr/>
-              <a:t>10/4/2021</a:t>
+              <a:t>10/5/2021</a:t>
             </a:fld>
             <a:endParaRPr lang="en-US" dirty="0"/>
           </a:p>
@@ -4358,7 +4360,7 @@
             <a:fld id="{B61BEF0D-F0BB-DE4B-95CE-6DB70DBA9567}" type="datetimeFigureOut">
               <a:rPr lang="en-US" dirty="0"/>
               <a:pPr/>
-              <a:t>10/4/2021</a:t>
+              <a:t>10/5/2021</a:t>
             </a:fld>
             <a:endParaRPr lang="en-US" dirty="0"/>
           </a:p>
@@ -4610,7 +4612,7 @@
             <a:fld id="{B61BEF0D-F0BB-DE4B-95CE-6DB70DBA9567}" type="datetimeFigureOut">
               <a:rPr lang="en-US" dirty="0"/>
               <a:pPr/>
-              <a:t>10/4/2021</a:t>
+              <a:t>10/5/2021</a:t>
             </a:fld>
             <a:endParaRPr lang="en-US" dirty="0"/>
           </a:p>
@@ -4922,7 +4924,7 @@
             <a:fld id="{B61BEF0D-F0BB-DE4B-95CE-6DB70DBA9567}" type="datetimeFigureOut">
               <a:rPr lang="en-US" dirty="0"/>
               <a:pPr/>
-              <a:t>10/4/2021</a:t>
+              <a:t>10/5/2021</a:t>
             </a:fld>
             <a:endParaRPr lang="en-US" dirty="0"/>
           </a:p>
@@ -5270,7 +5272,7 @@
             <a:fld id="{B61BEF0D-F0BB-DE4B-95CE-6DB70DBA9567}" type="datetimeFigureOut">
               <a:rPr lang="en-US" dirty="0"/>
               <a:pPr/>
-              <a:t>10/4/2021</a:t>
+              <a:t>10/5/2021</a:t>
             </a:fld>
             <a:endParaRPr lang="en-US" dirty="0"/>
           </a:p>
@@ -5941,6 +5943,195 @@
 </p:sld>
 </file>
 
+<file path=ppt/slides/slide10.xml><?xml version="1.0" encoding="utf-8"?>
+<p:sld xmlns:a="http://schemas.openxmlformats.org/drawingml/2006/main" xmlns:r="http://schemas.openxmlformats.org/officeDocument/2006/relationships" xmlns:p="http://schemas.openxmlformats.org/presentationml/2006/main">
+  <p:cSld>
+    <p:spTree>
+      <p:nvGrpSpPr>
+        <p:cNvPr id="1" name=""/>
+        <p:cNvGrpSpPr/>
+        <p:nvPr/>
+      </p:nvGrpSpPr>
+      <p:grpSpPr>
+        <a:xfrm>
+          <a:off x="0" y="0"/>
+          <a:ext cx="0" cy="0"/>
+          <a:chOff x="0" y="0"/>
+          <a:chExt cx="0" cy="0"/>
+        </a:xfrm>
+      </p:grpSpPr>
+      <p:sp>
+        <p:nvSpPr>
+          <p:cNvPr id="2" name="Titre 1">
+            <a:extLst>
+              <a:ext uri="{FF2B5EF4-FFF2-40B4-BE49-F238E27FC236}">
+                <a16:creationId xmlns:a16="http://schemas.microsoft.com/office/drawing/2014/main" id="{474F59CB-05C6-405A-96FC-50A347E0CD4F}"/>
+              </a:ext>
+            </a:extLst>
+          </p:cNvPr>
+          <p:cNvSpPr>
+            <a:spLocks noGrp="1"/>
+          </p:cNvSpPr>
+          <p:nvPr>
+            <p:ph type="title"/>
+          </p:nvPr>
+        </p:nvSpPr>
+        <p:spPr/>
+        <p:txBody>
+          <a:bodyPr>
+            <a:normAutofit/>
+          </a:bodyPr>
+          <a:lstStyle/>
+          <a:p>
+            <a:r>
+              <a:rPr lang="fr-FR" dirty="0">
+                <a:solidFill>
+                  <a:srgbClr val="FE8800"/>
+                </a:solidFill>
+              </a:rPr>
+              <a:t>Les comptes</a:t>
+            </a:r>
+            <a:endParaRPr lang="fr-FR" dirty="0"/>
+          </a:p>
+        </p:txBody>
+      </p:sp>
+      <p:sp>
+        <p:nvSpPr>
+          <p:cNvPr id="3" name="Espace réservé du contenu 2">
+            <a:extLst>
+              <a:ext uri="{FF2B5EF4-FFF2-40B4-BE49-F238E27FC236}">
+                <a16:creationId xmlns:a16="http://schemas.microsoft.com/office/drawing/2014/main" id="{E5AB3C35-F865-4BA6-A33E-802714B5B049}"/>
+              </a:ext>
+            </a:extLst>
+          </p:cNvPr>
+          <p:cNvSpPr>
+            <a:spLocks noGrp="1"/>
+          </p:cNvSpPr>
+          <p:nvPr>
+            <p:ph idx="1"/>
+          </p:nvPr>
+        </p:nvSpPr>
+        <p:spPr/>
+        <p:txBody>
+          <a:bodyPr>
+            <a:normAutofit/>
+          </a:bodyPr>
+          <a:lstStyle/>
+          <a:p>
+            <a:pPr lvl="1"/>
+            <a:r>
+              <a:rPr lang="fr-FR" sz="1800" dirty="0">
+                <a:solidFill>
+                  <a:schemeClr val="tx1"/>
+                </a:solidFill>
+              </a:rPr>
+              <a:t>Directrice Service Client : </a:t>
+            </a:r>
+            <a:r>
+              <a:rPr lang="fr-FR" sz="1800" dirty="0" err="1">
+                <a:solidFill>
+                  <a:schemeClr val="tx1"/>
+                </a:solidFill>
+              </a:rPr>
+              <a:t>adminDIR</a:t>
+            </a:r>
+            <a:r>
+              <a:rPr lang="fr-FR" sz="1800" dirty="0">
+                <a:solidFill>
+                  <a:schemeClr val="tx1"/>
+                </a:solidFill>
+              </a:rPr>
+              <a:t>, </a:t>
+            </a:r>
+            <a:r>
+              <a:rPr lang="fr-FR" sz="1800" dirty="0" err="1">
+                <a:solidFill>
+                  <a:schemeClr val="tx1"/>
+                </a:solidFill>
+              </a:rPr>
+              <a:t>sarah</a:t>
+            </a:r>
+            <a:endParaRPr lang="fr-FR" sz="1800" dirty="0">
+              <a:solidFill>
+                <a:schemeClr val="tx1"/>
+              </a:solidFill>
+            </a:endParaRPr>
+          </a:p>
+          <a:p>
+            <a:pPr lvl="1"/>
+            <a:r>
+              <a:rPr lang="fr-FR" sz="1800" i="0" dirty="0">
+                <a:solidFill>
+                  <a:schemeClr val="tx1"/>
+                </a:solidFill>
+                <a:effectLst/>
+              </a:rPr>
+              <a:t>Editeurs : Editeur1, editeur1 / Editeur2, editeur2</a:t>
+            </a:r>
+          </a:p>
+          <a:p>
+            <a:pPr lvl="1"/>
+            <a:r>
+              <a:rPr lang="fr-FR" sz="1800" dirty="0" err="1">
+                <a:solidFill>
+                  <a:schemeClr val="tx1"/>
+                </a:solidFill>
+              </a:rPr>
+              <a:t>AdminOS</a:t>
+            </a:r>
+            <a:r>
+              <a:rPr lang="fr-FR" sz="1800" dirty="0">
+                <a:solidFill>
+                  <a:schemeClr val="tx1"/>
+                </a:solidFill>
+              </a:rPr>
+              <a:t> (compte temporaire utilisé pour la conception du site)</a:t>
+            </a:r>
+          </a:p>
+          <a:p>
+            <a:pPr lvl="1"/>
+            <a:r>
+              <a:rPr lang="fr-FR" sz="1800" i="0" dirty="0" err="1">
+                <a:solidFill>
+                  <a:schemeClr val="tx1"/>
+                </a:solidFill>
+                <a:effectLst/>
+              </a:rPr>
+              <a:t>AdminFM</a:t>
+            </a:r>
+            <a:r>
+              <a:rPr lang="fr-FR" sz="1800" i="0" dirty="0">
+                <a:solidFill>
+                  <a:schemeClr val="tx1"/>
+                </a:solidFill>
+                <a:effectLst/>
+              </a:rPr>
+              <a:t> </a:t>
+            </a:r>
+            <a:r>
+              <a:rPr lang="fr-FR" sz="1800" dirty="0">
+                <a:solidFill>
+                  <a:schemeClr val="tx1"/>
+                </a:solidFill>
+              </a:rPr>
+              <a:t>(compte temporaire utilisé pour la conception du site)</a:t>
+            </a:r>
+          </a:p>
+        </p:txBody>
+      </p:sp>
+    </p:spTree>
+    <p:extLst>
+      <p:ext uri="{BB962C8B-B14F-4D97-AF65-F5344CB8AC3E}">
+        <p14:creationId xmlns:p14="http://schemas.microsoft.com/office/powerpoint/2010/main" val="1784159053"/>
+      </p:ext>
+    </p:extLst>
+  </p:cSld>
+  <p:clrMapOvr>
+    <a:masterClrMapping/>
+  </p:clrMapOvr>
+</p:sld>
+</file>
+
 <file path=ppt/slides/slide2.xml><?xml version="1.0" encoding="utf-8"?>
 <p:sld xmlns:a="http://schemas.openxmlformats.org/drawingml/2006/main" xmlns:r="http://schemas.openxmlformats.org/officeDocument/2006/relationships" xmlns:p="http://schemas.openxmlformats.org/presentationml/2006/main">
   <p:cSld>
@@ -6012,6 +6203,10 @@
             <a:r>
               <a:rPr lang="fr-FR" sz="2200" strike="sngStrike" dirty="0"/>
               <a:t>De préférence « one-page » </a:t>
+            </a:r>
+            <a:r>
+              <a:rPr lang="fr-FR" sz="2200" dirty="0"/>
+              <a:t>(page vitrine + page contact + page des articles)</a:t>
             </a:r>
           </a:p>
           <a:p>
@@ -6144,15 +6339,7 @@
           <a:p>
             <a:r>
               <a:rPr lang="fr-FR" sz="2000" dirty="0"/>
-              <a:t>Lutte anti-gaspillage (engagement producteurs locaux (éco </a:t>
-            </a:r>
-            <a:r>
-              <a:rPr lang="fr-FR" sz="2000" dirty="0" err="1"/>
-              <a:t>carbonne</a:t>
-            </a:r>
-            <a:r>
-              <a:rPr lang="fr-FR" sz="2000" dirty="0"/>
-              <a:t>), repartez avec ce que vous n’avez pas mangé (non retenu))</a:t>
+              <a:t>Lutte anti-gaspillage (engagement producteurs locaux (éco-carbone), repartez avec ce que vous n’avez pas mangé (non retenu))</a:t>
             </a:r>
           </a:p>
           <a:p>
@@ -6166,7 +6353,7 @@
             </a:r>
             <a:r>
               <a:rPr lang="fr-FR" sz="2000" dirty="0"/>
-              <a:t> (déjeuner d’affaires)</a:t>
+              <a:t> (déjeuner d’affaires, Wifi gratuit)</a:t>
             </a:r>
           </a:p>
         </p:txBody>
@@ -6301,21 +6488,7 @@
           <a:p>
             <a:r>
               <a:rPr lang="fr-FR" sz="1800" dirty="0"/>
-              <a:t>Blossom Recette (orange sur blanc)</a:t>
-            </a:r>
-          </a:p>
-          <a:p>
-            <a:pPr lvl="1"/>
-            <a:r>
-              <a:rPr lang="fr-FR" sz="1800" dirty="0"/>
-              <a:t>+ couleurs cohérentes avec le logo </a:t>
-            </a:r>
-          </a:p>
-          <a:p>
-            <a:pPr lvl="1"/>
-            <a:r>
-              <a:rPr lang="fr-FR" sz="1800" dirty="0"/>
-              <a:t>- fond blanc</a:t>
+              <a:t>Blossom Recette </a:t>
             </a:r>
           </a:p>
           <a:p>
@@ -6329,21 +6502,7 @@
             </a:r>
             <a:r>
               <a:rPr lang="fr-FR" sz="1800" dirty="0"/>
-              <a:t> Restaurant » (orange sur noir)</a:t>
-            </a:r>
-          </a:p>
-          <a:p>
-            <a:pPr lvl="1"/>
-            <a:r>
-              <a:rPr lang="fr-FR" sz="1800" dirty="0"/>
-              <a:t>+ couleurs orange sur fond noir </a:t>
-            </a:r>
-          </a:p>
-          <a:p>
-            <a:pPr lvl="1"/>
-            <a:r>
-              <a:rPr lang="fr-FR" sz="1800" dirty="0"/>
-              <a:t>- architecturé autour des articles sur la page d’accueil</a:t>
+              <a:t> Restaurant » </a:t>
             </a:r>
           </a:p>
           <a:p>
@@ -6351,19 +6510,6 @@
               <a:rPr lang="fr-FR" sz="1800" dirty="0"/>
               <a:t>Astra</a:t>
             </a:r>
-          </a:p>
-          <a:p>
-            <a:pPr lvl="1"/>
-            <a:r>
-              <a:rPr lang="fr-FR" sz="1800" dirty="0"/>
-              <a:t>simple donc facilement modifiable</a:t>
-            </a:r>
-          </a:p>
-          <a:p>
-            <a:pPr marL="0" indent="0">
-              <a:buNone/>
-            </a:pPr>
-            <a:endParaRPr lang="fr-FR" sz="2000" dirty="0"/>
           </a:p>
         </p:txBody>
       </p:sp>
@@ -6426,7 +6572,7 @@
                   <a:srgbClr val="FE8800"/>
                 </a:solidFill>
               </a:rPr>
-              <a:t>Le thème Oncle Sammy</a:t>
+              <a:t>Les thèmes de référence</a:t>
             </a:r>
             <a:endParaRPr lang="fr-FR" dirty="0"/>
           </a:p>
@@ -6448,7 +6594,12 @@
             <p:ph idx="1"/>
           </p:nvPr>
         </p:nvSpPr>
-        <p:spPr/>
+        <p:spPr>
+          <a:xfrm>
+            <a:off x="1295402" y="2556932"/>
+            <a:ext cx="5818462" cy="3318936"/>
+          </a:xfrm>
+        </p:spPr>
         <p:txBody>
           <a:bodyPr>
             <a:normAutofit/>
@@ -6457,93 +6608,69 @@
           <a:p>
             <a:r>
               <a:rPr lang="fr-FR" sz="1800" dirty="0"/>
-              <a:t>Une combinaison des </a:t>
-            </a:r>
-            <a:r>
-              <a:rPr lang="fr-FR" sz="1800" dirty="0" err="1"/>
-              <a:t>templates</a:t>
-            </a:r>
-            <a:r>
-              <a:rPr lang="fr-FR" sz="1800" dirty="0"/>
-              <a:t> « </a:t>
-            </a:r>
-            <a:r>
-              <a:rPr lang="fr-FR" sz="1800" dirty="0" err="1"/>
-              <a:t>Classic</a:t>
-            </a:r>
-            <a:r>
-              <a:rPr lang="fr-FR" sz="1800" dirty="0"/>
-              <a:t> Restaurant » et « Astra »</a:t>
-            </a:r>
-          </a:p>
-          <a:p>
-            <a:r>
-              <a:rPr lang="fr-FR" sz="1800" dirty="0"/>
-              <a:t>Le thème de fond inspiré du </a:t>
-            </a:r>
-            <a:r>
-              <a:rPr lang="fr-FR" sz="1800" dirty="0" err="1"/>
-              <a:t>template</a:t>
-            </a:r>
-            <a:r>
-              <a:rPr lang="fr-FR" sz="1800" dirty="0"/>
-              <a:t> « </a:t>
-            </a:r>
-            <a:r>
-              <a:rPr lang="fr-FR" sz="1800" dirty="0" err="1"/>
-              <a:t>Classic</a:t>
-            </a:r>
-            <a:r>
-              <a:rPr lang="fr-FR" sz="1800" dirty="0"/>
-              <a:t> Restaurant » a été retenu mais éclairci</a:t>
-            </a:r>
-          </a:p>
-          <a:p>
-            <a:r>
-              <a:rPr lang="fr-FR" sz="1800" dirty="0"/>
-              <a:t>Nous n’avons pas retenu la structure « Article »  de la page d’accueil du </a:t>
-            </a:r>
-            <a:r>
-              <a:rPr lang="fr-FR" sz="1800" dirty="0" err="1"/>
-              <a:t>template</a:t>
-            </a:r>
-            <a:r>
-              <a:rPr lang="fr-FR" sz="1800" dirty="0"/>
-              <a:t> « </a:t>
-            </a:r>
-            <a:r>
-              <a:rPr lang="fr-FR" sz="1800" dirty="0" err="1"/>
-              <a:t>Classis</a:t>
-            </a:r>
-            <a:r>
-              <a:rPr lang="fr-FR" sz="1800" dirty="0"/>
-              <a:t> Restaurant ». </a:t>
-            </a:r>
-          </a:p>
-          <a:p>
-            <a:r>
-              <a:rPr lang="fr-FR" sz="1800" dirty="0"/>
-              <a:t>La simplicité du thème « Astra » permet de présenter la page d’accueil en une page déroulante qui donne accès à la page des produits présentés en articles modifiables sans dev supplémentaires</a:t>
-            </a:r>
-          </a:p>
-          <a:p>
-            <a:r>
-              <a:rPr lang="fr-FR" sz="1800" dirty="0"/>
-              <a:t>La page contact est accessible à tout moment via le menu</a:t>
-            </a:r>
-          </a:p>
-          <a:p>
-            <a:r>
-              <a:rPr lang="fr-FR" sz="1800" dirty="0"/>
-              <a:t>Les couleurs Orange,  Rouge, Blanc et Noir sont celles du logo</a:t>
-            </a:r>
-          </a:p>
-        </p:txBody>
-      </p:sp>
+              <a:t>Blossom Recette</a:t>
+            </a:r>
+          </a:p>
+          <a:p>
+            <a:pPr lvl="1"/>
+            <a:r>
+              <a:rPr lang="fr-FR" sz="1400" dirty="0"/>
+              <a:t>- galerie d’image sur la page d’accueil (non retenu)</a:t>
+            </a:r>
+          </a:p>
+          <a:p>
+            <a:pPr lvl="1"/>
+            <a:r>
+              <a:rPr lang="fr-FR" sz="1400" dirty="0"/>
+              <a:t>- défilement des articles en bas de la page d’accueil</a:t>
+            </a:r>
+          </a:p>
+          <a:p>
+            <a:pPr lvl="1"/>
+            <a:r>
+              <a:rPr lang="fr-FR" sz="1400" dirty="0"/>
+              <a:t>+ le visuel attire l’œil et aiguise l’appétit dès la page d’accueil (retenu)</a:t>
+            </a:r>
+          </a:p>
+          <a:p>
+            <a:endParaRPr lang="fr-FR" sz="2000" dirty="0"/>
+          </a:p>
+        </p:txBody>
+      </p:sp>
+      <p:pic>
+        <p:nvPicPr>
+          <p:cNvPr id="4" name="Image 3">
+            <a:extLst>
+              <a:ext uri="{FF2B5EF4-FFF2-40B4-BE49-F238E27FC236}">
+                <a16:creationId xmlns:a16="http://schemas.microsoft.com/office/drawing/2014/main" id="{490449D1-471E-4903-BF18-14C75C466FC4}"/>
+              </a:ext>
+            </a:extLst>
+          </p:cNvPr>
+          <p:cNvPicPr>
+            <a:picLocks noChangeAspect="1"/>
+          </p:cNvPicPr>
+          <p:nvPr/>
+        </p:nvPicPr>
+        <p:blipFill>
+          <a:blip r:embed="rId2"/>
+          <a:stretch>
+            <a:fillRect/>
+          </a:stretch>
+        </p:blipFill>
+        <p:spPr>
+          <a:xfrm>
+            <a:off x="7852095" y="2556932"/>
+            <a:ext cx="2278859" cy="1890343"/>
+          </a:xfrm>
+          <a:prstGeom prst="rect">
+            <a:avLst/>
+          </a:prstGeom>
+        </p:spPr>
+      </p:pic>
     </p:spTree>
     <p:extLst>
       <p:ext uri="{BB962C8B-B14F-4D97-AF65-F5344CB8AC3E}">
-        <p14:creationId xmlns:p14="http://schemas.microsoft.com/office/powerpoint/2010/main" val="284927061"/>
+        <p14:creationId xmlns:p14="http://schemas.microsoft.com/office/powerpoint/2010/main" val="521796567"/>
       </p:ext>
     </p:extLst>
   </p:cSld>
@@ -6599,7 +6726,7 @@
                   <a:srgbClr val="FE8800"/>
                 </a:solidFill>
               </a:rPr>
-              <a:t>Les plug-in</a:t>
+              <a:t>Les thèmes de référence</a:t>
             </a:r>
             <a:endParaRPr lang="fr-FR" dirty="0"/>
           </a:p>
@@ -6621,112 +6748,119 @@
             <p:ph idx="1"/>
           </p:nvPr>
         </p:nvSpPr>
-        <p:spPr/>
+        <p:spPr>
+          <a:xfrm>
+            <a:off x="1295401" y="2556932"/>
+            <a:ext cx="5222845" cy="3318936"/>
+          </a:xfrm>
+        </p:spPr>
         <p:txBody>
           <a:bodyPr>
             <a:normAutofit/>
           </a:bodyPr>
           <a:lstStyle/>
           <a:p>
+            <a:r>
+              <a:rPr lang="fr-FR" sz="1800" dirty="0"/>
+              <a:t>« </a:t>
+            </a:r>
+            <a:r>
+              <a:rPr lang="fr-FR" sz="1800" dirty="0" err="1"/>
+              <a:t>Classic</a:t>
+            </a:r>
+            <a:r>
+              <a:rPr lang="fr-FR" sz="1800" dirty="0"/>
+              <a:t> Restaurant »</a:t>
+            </a:r>
+          </a:p>
+          <a:p>
             <a:pPr lvl="1"/>
             <a:r>
-              <a:rPr lang="fr-FR" sz="1800" i="0" dirty="0">
-                <a:solidFill>
-                  <a:schemeClr val="tx1"/>
-                </a:solidFill>
-                <a:effectLst/>
-              </a:rPr>
-              <a:t>Contact </a:t>
-            </a:r>
-            <a:r>
-              <a:rPr lang="fr-FR" sz="1800" i="0" dirty="0" err="1">
-                <a:solidFill>
-                  <a:schemeClr val="tx1"/>
-                </a:solidFill>
-                <a:effectLst/>
-              </a:rPr>
-              <a:t>Form</a:t>
-            </a:r>
-            <a:r>
-              <a:rPr lang="fr-FR" sz="1800" i="0" dirty="0">
-                <a:solidFill>
-                  <a:schemeClr val="tx1"/>
-                </a:solidFill>
-                <a:effectLst/>
-              </a:rPr>
-              <a:t> 7 / Contact </a:t>
-            </a:r>
-            <a:r>
-              <a:rPr lang="fr-FR" sz="1800" i="0" dirty="0" err="1">
-                <a:solidFill>
-                  <a:schemeClr val="tx1"/>
-                </a:solidFill>
-                <a:effectLst/>
-              </a:rPr>
-              <a:t>Form</a:t>
-            </a:r>
-            <a:r>
-              <a:rPr lang="fr-FR" sz="1800" i="0" dirty="0">
-                <a:solidFill>
-                  <a:schemeClr val="tx1"/>
-                </a:solidFill>
-                <a:effectLst/>
-              </a:rPr>
-              <a:t> CFDB7</a:t>
-            </a:r>
-            <a:endParaRPr lang="fr-FR" sz="1800" dirty="0">
-              <a:solidFill>
-                <a:schemeClr val="tx1"/>
-              </a:solidFill>
-            </a:endParaRPr>
+              <a:rPr lang="fr-FR" sz="1400" dirty="0"/>
+              <a:t>+ le fond de page foncé et l’ambiance « Restaurant </a:t>
+            </a:r>
+            <a:r>
+              <a:rPr lang="fr-FR" sz="1400" dirty="0" err="1"/>
+              <a:t>classic</a:t>
+            </a:r>
+            <a:r>
+              <a:rPr lang="fr-FR" sz="1400" dirty="0"/>
+              <a:t> »</a:t>
+            </a:r>
           </a:p>
           <a:p>
             <a:pPr lvl="1"/>
             <a:r>
-              <a:rPr lang="fr-FR" sz="1800" i="0" dirty="0">
-                <a:solidFill>
-                  <a:schemeClr val="tx1"/>
-                </a:solidFill>
-                <a:effectLst/>
-              </a:rPr>
-              <a:t>Custom Fonts (Police Bernadette)</a:t>
-            </a:r>
-          </a:p>
-          <a:p>
-            <a:pPr lvl="1"/>
-            <a:r>
-              <a:rPr lang="fr-FR" sz="1800" i="0" dirty="0">
-                <a:solidFill>
-                  <a:schemeClr val="tx1"/>
-                </a:solidFill>
-                <a:effectLst/>
-              </a:rPr>
-              <a:t>WordPress Importer</a:t>
-            </a:r>
-          </a:p>
-          <a:p>
-            <a:pPr lvl="1"/>
-            <a:r>
-              <a:rPr lang="fr-FR" sz="1800" i="0" dirty="0">
-                <a:solidFill>
-                  <a:schemeClr val="tx1"/>
-                </a:solidFill>
-                <a:effectLst/>
-              </a:rPr>
-              <a:t>Beaver Builder Plugin (Lite Version)</a:t>
-            </a:r>
-            <a:endParaRPr lang="fr-FR" sz="1800" dirty="0">
-              <a:solidFill>
-                <a:schemeClr val="tx1"/>
-              </a:solidFill>
-            </a:endParaRPr>
-          </a:p>
-        </p:txBody>
-      </p:sp>
+              <a:rPr lang="fr-FR" sz="1400" dirty="0"/>
+              <a:t>- architecturé autour des articles sur la page d’accueil</a:t>
+            </a:r>
+          </a:p>
+        </p:txBody>
+      </p:sp>
+      <p:pic>
+        <p:nvPicPr>
+          <p:cNvPr id="4" name="Image 3">
+            <a:extLst>
+              <a:ext uri="{FF2B5EF4-FFF2-40B4-BE49-F238E27FC236}">
+                <a16:creationId xmlns:a16="http://schemas.microsoft.com/office/drawing/2014/main" id="{76028865-E9F7-40D7-9578-9F09BAA1A19D}"/>
+              </a:ext>
+            </a:extLst>
+          </p:cNvPr>
+          <p:cNvPicPr>
+            <a:picLocks noChangeAspect="1"/>
+          </p:cNvPicPr>
+          <p:nvPr/>
+        </p:nvPicPr>
+        <p:blipFill>
+          <a:blip r:embed="rId2"/>
+          <a:stretch>
+            <a:fillRect/>
+          </a:stretch>
+        </p:blipFill>
+        <p:spPr>
+          <a:xfrm>
+            <a:off x="7449423" y="2556932"/>
+            <a:ext cx="2606449" cy="2158804"/>
+          </a:xfrm>
+          <a:prstGeom prst="rect">
+            <a:avLst/>
+          </a:prstGeom>
+        </p:spPr>
+      </p:pic>
+      <p:pic>
+        <p:nvPicPr>
+          <p:cNvPr id="5" name="Image 4">
+            <a:extLst>
+              <a:ext uri="{FF2B5EF4-FFF2-40B4-BE49-F238E27FC236}">
+                <a16:creationId xmlns:a16="http://schemas.microsoft.com/office/drawing/2014/main" id="{36B8E757-7C47-4281-A549-F15CF3C0B20A}"/>
+              </a:ext>
+            </a:extLst>
+          </p:cNvPr>
+          <p:cNvPicPr>
+            <a:picLocks noChangeAspect="1"/>
+          </p:cNvPicPr>
+          <p:nvPr/>
+        </p:nvPicPr>
+        <p:blipFill>
+          <a:blip r:embed="rId3"/>
+          <a:stretch>
+            <a:fillRect/>
+          </a:stretch>
+        </p:blipFill>
+        <p:spPr>
+          <a:xfrm>
+            <a:off x="1862356" y="4196157"/>
+            <a:ext cx="3414319" cy="1608132"/>
+          </a:xfrm>
+          <a:prstGeom prst="rect">
+            <a:avLst/>
+          </a:prstGeom>
+        </p:spPr>
+      </p:pic>
     </p:spTree>
     <p:extLst>
       <p:ext uri="{BB962C8B-B14F-4D97-AF65-F5344CB8AC3E}">
-        <p14:creationId xmlns:p14="http://schemas.microsoft.com/office/powerpoint/2010/main" val="4149491076"/>
+        <p14:creationId xmlns:p14="http://schemas.microsoft.com/office/powerpoint/2010/main" val="3844985225"/>
       </p:ext>
     </p:extLst>
   </p:cSld>
@@ -6782,7 +6916,7 @@
                   <a:srgbClr val="FE8800"/>
                 </a:solidFill>
               </a:rPr>
-              <a:t>Les comptes</a:t>
+              <a:t>Les thèmes de référence</a:t>
             </a:r>
             <a:endParaRPr lang="fr-FR" dirty="0"/>
           </a:p>
@@ -6804,88 +6938,380 @@
             <p:ph idx="1"/>
           </p:nvPr>
         </p:nvSpPr>
-        <p:spPr/>
+        <p:spPr>
+          <a:xfrm>
+            <a:off x="1295401" y="2556932"/>
+            <a:ext cx="5533238" cy="1553674"/>
+          </a:xfrm>
+        </p:spPr>
         <p:txBody>
           <a:bodyPr>
             <a:normAutofit/>
           </a:bodyPr>
           <a:lstStyle/>
           <a:p>
+            <a:r>
+              <a:rPr lang="fr-FR" sz="1800" dirty="0"/>
+              <a:t>Astra</a:t>
+            </a:r>
+          </a:p>
+          <a:p>
             <a:pPr lvl="1"/>
             <a:r>
-              <a:rPr lang="fr-FR" sz="1800" dirty="0">
-                <a:solidFill>
-                  <a:schemeClr val="tx1"/>
-                </a:solidFill>
-              </a:rPr>
-              <a:t>Directrice Service Client : </a:t>
-            </a:r>
-            <a:r>
-              <a:rPr lang="fr-FR" sz="1800" dirty="0" err="1">
-                <a:solidFill>
-                  <a:schemeClr val="tx1"/>
-                </a:solidFill>
-              </a:rPr>
-              <a:t>adminDIR</a:t>
-            </a:r>
-            <a:endParaRPr lang="fr-FR" sz="1800" dirty="0">
-              <a:solidFill>
-                <a:schemeClr val="tx1"/>
-              </a:solidFill>
-            </a:endParaRPr>
+              <a:rPr lang="fr-FR" sz="1400" dirty="0"/>
+              <a:t>+ moins contraignant dans la mise en page </a:t>
+            </a:r>
           </a:p>
           <a:p>
             <a:pPr lvl="1"/>
             <a:r>
-              <a:rPr lang="fr-FR" sz="1800" i="0" dirty="0">
-                <a:solidFill>
-                  <a:schemeClr val="tx1"/>
+              <a:rPr lang="fr-FR" sz="1400" dirty="0"/>
+              <a:t>+ permet d’implémenter les + des autres thèmes</a:t>
+            </a:r>
+          </a:p>
+          <a:p>
+            <a:pPr marL="0" indent="0">
+              <a:buNone/>
+            </a:pPr>
+            <a:endParaRPr lang="fr-FR" sz="2000" dirty="0"/>
+          </a:p>
+        </p:txBody>
+      </p:sp>
+      <p:pic>
+        <p:nvPicPr>
+          <p:cNvPr id="4" name="Image 3">
+            <a:extLst>
+              <a:ext uri="{FF2B5EF4-FFF2-40B4-BE49-F238E27FC236}">
+                <a16:creationId xmlns:a16="http://schemas.microsoft.com/office/drawing/2014/main" id="{FA5A6BEC-A971-49DE-9767-3CCBE4C26A61}"/>
+              </a:ext>
+            </a:extLst>
+          </p:cNvPr>
+          <p:cNvPicPr>
+            <a:picLocks noChangeAspect="1"/>
+          </p:cNvPicPr>
+          <p:nvPr/>
+        </p:nvPicPr>
+        <p:blipFill>
+          <a:blip r:embed="rId2"/>
+          <a:stretch>
+            <a:fillRect/>
+          </a:stretch>
+        </p:blipFill>
+        <p:spPr>
+          <a:xfrm>
+            <a:off x="8018460" y="2485503"/>
+            <a:ext cx="2361533" cy="1625103"/>
+          </a:xfrm>
+          <a:prstGeom prst="rect">
+            <a:avLst/>
+          </a:prstGeom>
+        </p:spPr>
+      </p:pic>
+      <p:sp>
+        <p:nvSpPr>
+          <p:cNvPr id="5" name="Espace réservé du contenu 2">
+            <a:extLst>
+              <a:ext uri="{FF2B5EF4-FFF2-40B4-BE49-F238E27FC236}">
+                <a16:creationId xmlns:a16="http://schemas.microsoft.com/office/drawing/2014/main" id="{8E4422A8-EDAE-4F8B-A295-8B07130CCFDD}"/>
+              </a:ext>
+            </a:extLst>
+          </p:cNvPr>
+          <p:cNvSpPr txBox="1">
+            <a:spLocks/>
+          </p:cNvSpPr>
+          <p:nvPr/>
+        </p:nvSpPr>
+        <p:spPr>
+          <a:xfrm>
+            <a:off x="1295401" y="3877547"/>
+            <a:ext cx="5533238" cy="1553674"/>
+          </a:xfrm>
+          <a:prstGeom prst="rect">
+            <a:avLst/>
+          </a:prstGeom>
+        </p:spPr>
+        <p:txBody>
+          <a:bodyPr vert="horz" lIns="91440" tIns="45720" rIns="91440" bIns="45720" rtlCol="0" anchor="t">
+            <a:normAutofit/>
+          </a:bodyPr>
+          <a:lstStyle>
+            <a:lvl1pPr marL="285750" indent="-285750" algn="l" defTabSz="457200" rtl="0" eaLnBrk="1" latinLnBrk="0" hangingPunct="1">
+              <a:spcBef>
+                <a:spcPct val="20000"/>
+              </a:spcBef>
+              <a:spcAft>
+                <a:spcPts val="600"/>
+              </a:spcAft>
+              <a:buClr>
+                <a:schemeClr val="accent1"/>
+              </a:buClr>
+              <a:buSzPct val="115000"/>
+              <a:buFont typeface="Arial"/>
+              <a:buChar char="•"/>
+              <a:defRPr sz="2400" kern="1200" cap="none">
+                <a:solidFill>
+                  <a:schemeClr val="tx1">
+                    <a:lumMod val="85000"/>
+                    <a:lumOff val="15000"/>
+                  </a:schemeClr>
                 </a:solidFill>
                 <a:effectLst/>
-              </a:rPr>
-              <a:t>Editeurs : Editeur1, Editeur2</a:t>
-            </a:r>
-          </a:p>
-          <a:p>
-            <a:pPr lvl="1"/>
-            <a:r>
-              <a:rPr lang="fr-FR" sz="1800" dirty="0" err="1">
-                <a:solidFill>
-                  <a:schemeClr val="tx1"/>
-                </a:solidFill>
-              </a:rPr>
-              <a:t>AdminOS</a:t>
-            </a:r>
-            <a:endParaRPr lang="fr-FR" sz="1800" dirty="0">
-              <a:solidFill>
-                <a:schemeClr val="tx1"/>
-              </a:solidFill>
-            </a:endParaRPr>
-          </a:p>
-          <a:p>
-            <a:pPr lvl="1"/>
-            <a:r>
-              <a:rPr lang="fr-FR" sz="1800" i="0" dirty="0" err="1">
-                <a:solidFill>
-                  <a:schemeClr val="tx1"/>
+                <a:latin typeface="+mn-lt"/>
+                <a:ea typeface="+mn-ea"/>
+                <a:cs typeface="+mn-cs"/>
+              </a:defRPr>
+            </a:lvl1pPr>
+            <a:lvl2pPr marL="742950" indent="-285750" algn="l" defTabSz="457200" rtl="0" eaLnBrk="1" latinLnBrk="0" hangingPunct="1">
+              <a:spcBef>
+                <a:spcPct val="20000"/>
+              </a:spcBef>
+              <a:spcAft>
+                <a:spcPts val="600"/>
+              </a:spcAft>
+              <a:buClr>
+                <a:schemeClr val="accent1"/>
+              </a:buClr>
+              <a:buSzPct val="115000"/>
+              <a:buFont typeface="Arial"/>
+              <a:buChar char="•"/>
+              <a:defRPr sz="2000" kern="1200" cap="none">
+                <a:solidFill>
+                  <a:schemeClr val="tx1">
+                    <a:lumMod val="85000"/>
+                    <a:lumOff val="15000"/>
+                  </a:schemeClr>
                 </a:solidFill>
                 <a:effectLst/>
-              </a:rPr>
-              <a:t>AdminFM</a:t>
-            </a:r>
-            <a:endParaRPr lang="fr-FR" sz="1800" i="0" dirty="0">
-              <a:solidFill>
-                <a:schemeClr val="tx1"/>
-              </a:solidFill>
-              <a:effectLst/>
-            </a:endParaRPr>
-          </a:p>
-        </p:txBody>
-      </p:sp>
+                <a:latin typeface="+mn-lt"/>
+                <a:ea typeface="+mn-ea"/>
+                <a:cs typeface="+mn-cs"/>
+              </a:defRPr>
+            </a:lvl2pPr>
+            <a:lvl3pPr marL="1200150" indent="-285750" algn="l" defTabSz="457200" rtl="0" eaLnBrk="1" latinLnBrk="0" hangingPunct="1">
+              <a:spcBef>
+                <a:spcPct val="20000"/>
+              </a:spcBef>
+              <a:spcAft>
+                <a:spcPts val="600"/>
+              </a:spcAft>
+              <a:buClr>
+                <a:schemeClr val="accent1"/>
+              </a:buClr>
+              <a:buSzPct val="115000"/>
+              <a:buFont typeface="Arial"/>
+              <a:buChar char="•"/>
+              <a:defRPr sz="1800" kern="1200" cap="none">
+                <a:solidFill>
+                  <a:schemeClr val="tx1">
+                    <a:lumMod val="85000"/>
+                    <a:lumOff val="15000"/>
+                  </a:schemeClr>
+                </a:solidFill>
+                <a:effectLst/>
+                <a:latin typeface="+mn-lt"/>
+                <a:ea typeface="+mn-ea"/>
+                <a:cs typeface="+mn-cs"/>
+              </a:defRPr>
+            </a:lvl3pPr>
+            <a:lvl4pPr marL="1543050" indent="-171450" algn="l" defTabSz="457200" rtl="0" eaLnBrk="1" latinLnBrk="0" hangingPunct="1">
+              <a:spcBef>
+                <a:spcPct val="20000"/>
+              </a:spcBef>
+              <a:spcAft>
+                <a:spcPts val="600"/>
+              </a:spcAft>
+              <a:buClr>
+                <a:schemeClr val="accent1"/>
+              </a:buClr>
+              <a:buSzPct val="115000"/>
+              <a:buFont typeface="Arial"/>
+              <a:buChar char="•"/>
+              <a:defRPr sz="1600" kern="1200" cap="none">
+                <a:solidFill>
+                  <a:schemeClr val="tx1">
+                    <a:lumMod val="85000"/>
+                    <a:lumOff val="15000"/>
+                  </a:schemeClr>
+                </a:solidFill>
+                <a:effectLst/>
+                <a:latin typeface="+mn-lt"/>
+                <a:ea typeface="+mn-ea"/>
+                <a:cs typeface="+mn-cs"/>
+              </a:defRPr>
+            </a:lvl4pPr>
+            <a:lvl5pPr marL="2000250" indent="-171450" algn="l" defTabSz="457200" rtl="0" eaLnBrk="1" latinLnBrk="0" hangingPunct="1">
+              <a:spcBef>
+                <a:spcPct val="20000"/>
+              </a:spcBef>
+              <a:spcAft>
+                <a:spcPts val="600"/>
+              </a:spcAft>
+              <a:buClr>
+                <a:schemeClr val="accent1"/>
+              </a:buClr>
+              <a:buSzPct val="115000"/>
+              <a:buFont typeface="Arial"/>
+              <a:buChar char="•"/>
+              <a:defRPr sz="1400" kern="1200" cap="none">
+                <a:solidFill>
+                  <a:schemeClr val="tx1">
+                    <a:lumMod val="85000"/>
+                    <a:lumOff val="15000"/>
+                  </a:schemeClr>
+                </a:solidFill>
+                <a:effectLst/>
+                <a:latin typeface="+mn-lt"/>
+                <a:ea typeface="+mn-ea"/>
+                <a:cs typeface="+mn-cs"/>
+              </a:defRPr>
+            </a:lvl5pPr>
+            <a:lvl6pPr marL="2514600" indent="-228600" algn="l" defTabSz="457200" rtl="0" eaLnBrk="1" latinLnBrk="0" hangingPunct="1">
+              <a:spcBef>
+                <a:spcPct val="20000"/>
+              </a:spcBef>
+              <a:spcAft>
+                <a:spcPts val="600"/>
+              </a:spcAft>
+              <a:buClr>
+                <a:schemeClr val="accent1"/>
+              </a:buClr>
+              <a:buSzPct val="115000"/>
+              <a:buFont typeface="Arial"/>
+              <a:buChar char="•"/>
+              <a:defRPr sz="1400" kern="1200" cap="none">
+                <a:solidFill>
+                  <a:schemeClr val="tx1">
+                    <a:lumMod val="85000"/>
+                    <a:lumOff val="15000"/>
+                  </a:schemeClr>
+                </a:solidFill>
+                <a:effectLst/>
+                <a:latin typeface="+mn-lt"/>
+                <a:ea typeface="+mn-ea"/>
+                <a:cs typeface="+mn-cs"/>
+              </a:defRPr>
+            </a:lvl6pPr>
+            <a:lvl7pPr marL="2971800" indent="-228600" algn="l" defTabSz="457200" rtl="0" eaLnBrk="1" latinLnBrk="0" hangingPunct="1">
+              <a:spcBef>
+                <a:spcPct val="20000"/>
+              </a:spcBef>
+              <a:spcAft>
+                <a:spcPts val="600"/>
+              </a:spcAft>
+              <a:buClr>
+                <a:schemeClr val="accent1"/>
+              </a:buClr>
+              <a:buSzPct val="115000"/>
+              <a:buFont typeface="Arial"/>
+              <a:buChar char="•"/>
+              <a:defRPr sz="1400" kern="1200" cap="none">
+                <a:solidFill>
+                  <a:schemeClr val="tx1">
+                    <a:lumMod val="85000"/>
+                    <a:lumOff val="15000"/>
+                  </a:schemeClr>
+                </a:solidFill>
+                <a:effectLst/>
+                <a:latin typeface="+mn-lt"/>
+                <a:ea typeface="+mn-ea"/>
+                <a:cs typeface="+mn-cs"/>
+              </a:defRPr>
+            </a:lvl7pPr>
+            <a:lvl8pPr marL="3429000" indent="-228600" algn="l" defTabSz="457200" rtl="0" eaLnBrk="1" latinLnBrk="0" hangingPunct="1">
+              <a:spcBef>
+                <a:spcPct val="20000"/>
+              </a:spcBef>
+              <a:spcAft>
+                <a:spcPts val="600"/>
+              </a:spcAft>
+              <a:buClr>
+                <a:schemeClr val="accent1"/>
+              </a:buClr>
+              <a:buSzPct val="115000"/>
+              <a:buFont typeface="Arial"/>
+              <a:buChar char="•"/>
+              <a:defRPr sz="1400" kern="1200" cap="none">
+                <a:solidFill>
+                  <a:schemeClr val="tx1">
+                    <a:lumMod val="85000"/>
+                    <a:lumOff val="15000"/>
+                  </a:schemeClr>
+                </a:solidFill>
+                <a:effectLst/>
+                <a:latin typeface="+mn-lt"/>
+                <a:ea typeface="+mn-ea"/>
+                <a:cs typeface="+mn-cs"/>
+              </a:defRPr>
+            </a:lvl8pPr>
+            <a:lvl9pPr marL="3886200" indent="-228600" algn="l" defTabSz="457200" rtl="0" eaLnBrk="1" latinLnBrk="0" hangingPunct="1">
+              <a:spcBef>
+                <a:spcPct val="20000"/>
+              </a:spcBef>
+              <a:spcAft>
+                <a:spcPts val="600"/>
+              </a:spcAft>
+              <a:buClr>
+                <a:schemeClr val="accent1"/>
+              </a:buClr>
+              <a:buSzPct val="115000"/>
+              <a:buFont typeface="Arial"/>
+              <a:buChar char="•"/>
+              <a:defRPr sz="1400" kern="1200" cap="none">
+                <a:solidFill>
+                  <a:schemeClr val="tx1">
+                    <a:lumMod val="85000"/>
+                    <a:lumOff val="15000"/>
+                  </a:schemeClr>
+                </a:solidFill>
+                <a:effectLst/>
+                <a:latin typeface="+mn-lt"/>
+                <a:ea typeface="+mn-ea"/>
+                <a:cs typeface="+mn-cs"/>
+              </a:defRPr>
+            </a:lvl9pPr>
+          </a:lstStyle>
+          <a:p>
+            <a:r>
+              <a:rPr lang="fr-FR" sz="1800" dirty="0"/>
+              <a:t>Oncle Sammy</a:t>
+            </a:r>
+          </a:p>
+        </p:txBody>
+      </p:sp>
+      <p:pic>
+        <p:nvPicPr>
+          <p:cNvPr id="7" name="Image 6">
+            <a:extLst>
+              <a:ext uri="{FF2B5EF4-FFF2-40B4-BE49-F238E27FC236}">
+                <a16:creationId xmlns:a16="http://schemas.microsoft.com/office/drawing/2014/main" id="{411FEE3F-325B-4B03-B50C-E31D012B314D}"/>
+              </a:ext>
+            </a:extLst>
+          </p:cNvPr>
+          <p:cNvPicPr>
+            <a:picLocks noChangeAspect="1"/>
+          </p:cNvPicPr>
+          <p:nvPr/>
+        </p:nvPicPr>
+        <p:blipFill>
+          <a:blip r:embed="rId3"/>
+          <a:stretch>
+            <a:fillRect/>
+          </a:stretch>
+        </p:blipFill>
+        <p:spPr>
+          <a:xfrm>
+            <a:off x="3152845" y="4110606"/>
+            <a:ext cx="4588778" cy="1970665"/>
+          </a:xfrm>
+          <a:prstGeom prst="rect">
+            <a:avLst/>
+          </a:prstGeom>
+        </p:spPr>
+      </p:pic>
     </p:spTree>
     <p:extLst>
       <p:ext uri="{BB962C8B-B14F-4D97-AF65-F5344CB8AC3E}">
-        <p14:creationId xmlns:p14="http://schemas.microsoft.com/office/powerpoint/2010/main" val="1784159053"/>
+        <p14:creationId xmlns:p14="http://schemas.microsoft.com/office/powerpoint/2010/main" val="2915213787"/>
       </p:ext>
     </p:extLst>
   </p:cSld>
@@ -6941,7 +7367,7 @@
                   <a:srgbClr val="FE8800"/>
                 </a:solidFill>
               </a:rPr>
-              <a:t>Les couleurs / les polices</a:t>
+              <a:t>Le thème Oncle Sammy</a:t>
             </a:r>
             <a:endParaRPr lang="fr-FR" dirty="0"/>
           </a:p>
@@ -6966,72 +7392,31 @@
         <p:spPr/>
         <p:txBody>
           <a:bodyPr>
-            <a:normAutofit fontScale="85000" lnSpcReduction="20000"/>
+            <a:normAutofit/>
           </a:bodyPr>
           <a:lstStyle/>
           <a:p>
             <a:r>
-              <a:rPr lang="fr-FR" dirty="0">
-                <a:solidFill>
-                  <a:srgbClr val="FE8800"/>
-                </a:solidFill>
-              </a:rPr>
-              <a:t>couleurs</a:t>
-            </a:r>
-          </a:p>
-          <a:p>
-            <a:pPr lvl="1"/>
-            <a:r>
-              <a:rPr lang="fr-FR" sz="2100" dirty="0"/>
-              <a:t>orange #fe8800</a:t>
-            </a:r>
-          </a:p>
-          <a:p>
-            <a:pPr lvl="1"/>
-            <a:r>
-              <a:rPr lang="fr-FR" sz="2100" dirty="0"/>
-              <a:t>rouge #fc260a</a:t>
-            </a:r>
-          </a:p>
-          <a:p>
-            <a:pPr lvl="1"/>
-            <a:r>
-              <a:rPr lang="fr-FR" sz="2100" dirty="0"/>
-              <a:t>gris #f5f5f5</a:t>
-            </a:r>
-          </a:p>
-          <a:p>
-            <a:pPr lvl="1"/>
-            <a:r>
-              <a:rPr lang="fr-FR" sz="2100" dirty="0"/>
-              <a:t>noir #000000</a:t>
-            </a:r>
-          </a:p>
-          <a:p>
-            <a:pPr lvl="1"/>
-            <a:r>
-              <a:rPr lang="fr-FR" sz="2100" dirty="0"/>
-              <a:t>Blanc #ffffff</a:t>
-            </a:r>
-          </a:p>
-          <a:p>
-            <a:endParaRPr lang="fr-FR" dirty="0"/>
-          </a:p>
-          <a:p>
-            <a:r>
-              <a:rPr lang="fr-FR" dirty="0">
-                <a:solidFill>
-                  <a:srgbClr val="FE8800"/>
-                </a:solidFill>
-              </a:rPr>
-              <a:t>font</a:t>
-            </a:r>
-          </a:p>
-          <a:p>
-            <a:pPr lvl="1"/>
-            <a:r>
-              <a:rPr lang="fr-FR" sz="2100" dirty="0"/>
-              <a:t>Parisienne, Bernadette, Open Sans</a:t>
+              <a:rPr lang="fr-FR" sz="1800" dirty="0"/>
+              <a:t>Une combinaison de visuel repris dans le thème personnalisé « Oncle Sammy »</a:t>
+            </a:r>
+          </a:p>
+          <a:p>
+            <a:r>
+              <a:rPr lang="fr-FR" sz="1800" dirty="0"/>
+              <a:t>Des articles modifiables sans développement complémentaires, accessibles à l’équipe d’éditeurs et d’administrateurs</a:t>
+            </a:r>
+          </a:p>
+          <a:p>
+            <a:r>
+              <a:rPr lang="fr-FR" sz="1800" dirty="0"/>
+              <a:t>La page contact est accessible à tout moment via le menu</a:t>
+            </a:r>
+          </a:p>
+          <a:p>
+            <a:r>
+              <a:rPr lang="fr-FR" sz="1800" dirty="0"/>
+              <a:t>Les couleurs Orange,  Rouge, Blanc et Noir sont celles du logo</a:t>
             </a:r>
           </a:p>
         </p:txBody>
@@ -7039,7 +7424,196 @@
     </p:spTree>
     <p:extLst>
       <p:ext uri="{BB962C8B-B14F-4D97-AF65-F5344CB8AC3E}">
-        <p14:creationId xmlns:p14="http://schemas.microsoft.com/office/powerpoint/2010/main" val="1855628225"/>
+        <p14:creationId xmlns:p14="http://schemas.microsoft.com/office/powerpoint/2010/main" val="284927061"/>
+      </p:ext>
+    </p:extLst>
+  </p:cSld>
+  <p:clrMapOvr>
+    <a:masterClrMapping/>
+  </p:clrMapOvr>
+</p:sld>
+</file>
+
+<file path=ppt/slides/slide9.xml><?xml version="1.0" encoding="utf-8"?>
+<p:sld xmlns:a="http://schemas.openxmlformats.org/drawingml/2006/main" xmlns:r="http://schemas.openxmlformats.org/officeDocument/2006/relationships" xmlns:p="http://schemas.openxmlformats.org/presentationml/2006/main">
+  <p:cSld>
+    <p:spTree>
+      <p:nvGrpSpPr>
+        <p:cNvPr id="1" name=""/>
+        <p:cNvGrpSpPr/>
+        <p:nvPr/>
+      </p:nvGrpSpPr>
+      <p:grpSpPr>
+        <a:xfrm>
+          <a:off x="0" y="0"/>
+          <a:ext cx="0" cy="0"/>
+          <a:chOff x="0" y="0"/>
+          <a:chExt cx="0" cy="0"/>
+        </a:xfrm>
+      </p:grpSpPr>
+      <p:sp>
+        <p:nvSpPr>
+          <p:cNvPr id="2" name="Titre 1">
+            <a:extLst>
+              <a:ext uri="{FF2B5EF4-FFF2-40B4-BE49-F238E27FC236}">
+                <a16:creationId xmlns:a16="http://schemas.microsoft.com/office/drawing/2014/main" id="{474F59CB-05C6-405A-96FC-50A347E0CD4F}"/>
+              </a:ext>
+            </a:extLst>
+          </p:cNvPr>
+          <p:cNvSpPr>
+            <a:spLocks noGrp="1"/>
+          </p:cNvSpPr>
+          <p:nvPr>
+            <p:ph type="title"/>
+          </p:nvPr>
+        </p:nvSpPr>
+        <p:spPr/>
+        <p:txBody>
+          <a:bodyPr>
+            <a:normAutofit/>
+          </a:bodyPr>
+          <a:lstStyle/>
+          <a:p>
+            <a:r>
+              <a:rPr lang="fr-FR" dirty="0">
+                <a:solidFill>
+                  <a:srgbClr val="FE8800"/>
+                </a:solidFill>
+              </a:rPr>
+              <a:t>Les plug-in de WordPress</a:t>
+            </a:r>
+            <a:endParaRPr lang="fr-FR" dirty="0"/>
+          </a:p>
+        </p:txBody>
+      </p:sp>
+      <p:sp>
+        <p:nvSpPr>
+          <p:cNvPr id="3" name="Espace réservé du contenu 2">
+            <a:extLst>
+              <a:ext uri="{FF2B5EF4-FFF2-40B4-BE49-F238E27FC236}">
+                <a16:creationId xmlns:a16="http://schemas.microsoft.com/office/drawing/2014/main" id="{E5AB3C35-F865-4BA6-A33E-802714B5B049}"/>
+              </a:ext>
+            </a:extLst>
+          </p:cNvPr>
+          <p:cNvSpPr>
+            <a:spLocks noGrp="1"/>
+          </p:cNvSpPr>
+          <p:nvPr>
+            <p:ph idx="1"/>
+          </p:nvPr>
+        </p:nvSpPr>
+        <p:spPr/>
+        <p:txBody>
+          <a:bodyPr>
+            <a:normAutofit/>
+          </a:bodyPr>
+          <a:lstStyle/>
+          <a:p>
+            <a:pPr lvl="1"/>
+            <a:r>
+              <a:rPr lang="fr-FR" sz="1800" i="0" dirty="0">
+                <a:solidFill>
+                  <a:schemeClr val="tx1"/>
+                </a:solidFill>
+                <a:effectLst/>
+              </a:rPr>
+              <a:t>Contact </a:t>
+            </a:r>
+            <a:r>
+              <a:rPr lang="fr-FR" sz="1800" i="0" dirty="0" err="1">
+                <a:solidFill>
+                  <a:schemeClr val="tx1"/>
+                </a:solidFill>
+                <a:effectLst/>
+              </a:rPr>
+              <a:t>Form</a:t>
+            </a:r>
+            <a:r>
+              <a:rPr lang="fr-FR" sz="1800" i="0" dirty="0">
+                <a:solidFill>
+                  <a:schemeClr val="tx1"/>
+                </a:solidFill>
+                <a:effectLst/>
+              </a:rPr>
+              <a:t> 7 / Contact </a:t>
+            </a:r>
+            <a:r>
+              <a:rPr lang="fr-FR" sz="1800" i="0" dirty="0" err="1">
+                <a:solidFill>
+                  <a:schemeClr val="tx1"/>
+                </a:solidFill>
+                <a:effectLst/>
+              </a:rPr>
+              <a:t>Form</a:t>
+            </a:r>
+            <a:r>
+              <a:rPr lang="fr-FR" sz="1800" i="0" dirty="0">
+                <a:solidFill>
+                  <a:schemeClr val="tx1"/>
+                </a:solidFill>
+                <a:effectLst/>
+              </a:rPr>
+              <a:t> CFDB7</a:t>
+            </a:r>
+            <a:endParaRPr lang="fr-FR" sz="1800" dirty="0">
+              <a:solidFill>
+                <a:schemeClr val="tx1"/>
+              </a:solidFill>
+            </a:endParaRPr>
+          </a:p>
+          <a:p>
+            <a:pPr lvl="1"/>
+            <a:r>
+              <a:rPr lang="fr-FR" sz="1800" i="0" dirty="0">
+                <a:solidFill>
+                  <a:schemeClr val="tx1"/>
+                </a:solidFill>
+                <a:effectLst/>
+              </a:rPr>
+              <a:t>Custom Fonts (Police Bernadette)</a:t>
+            </a:r>
+          </a:p>
+          <a:p>
+            <a:pPr lvl="1"/>
+            <a:r>
+              <a:rPr lang="fr-FR" sz="1800" i="0" dirty="0">
+                <a:solidFill>
+                  <a:schemeClr val="tx1"/>
+                </a:solidFill>
+                <a:effectLst/>
+              </a:rPr>
+              <a:t>WordPress Importer</a:t>
+            </a:r>
+          </a:p>
+          <a:p>
+            <a:pPr lvl="1"/>
+            <a:r>
+              <a:rPr lang="fr-FR" sz="1800" i="0" dirty="0">
+                <a:solidFill>
+                  <a:schemeClr val="tx1"/>
+                </a:solidFill>
+                <a:effectLst/>
+              </a:rPr>
+              <a:t>Beaver Builder Plugin (Lite Version)</a:t>
+            </a:r>
+          </a:p>
+          <a:p>
+            <a:pPr lvl="1"/>
+            <a:r>
+              <a:rPr lang="fr-FR" sz="1800" dirty="0">
+                <a:solidFill>
+                  <a:schemeClr val="tx1"/>
+                </a:solidFill>
+              </a:rPr>
+              <a:t>Timeline Bloc</a:t>
+            </a:r>
+          </a:p>
+        </p:txBody>
+      </p:sp>
+    </p:spTree>
+    <p:extLst>
+      <p:ext uri="{BB962C8B-B14F-4D97-AF65-F5344CB8AC3E}">
+        <p14:creationId xmlns:p14="http://schemas.microsoft.com/office/powerpoint/2010/main" val="4149491076"/>
       </p:ext>
     </p:extLst>
   </p:cSld>

</xml_diff>